<commit_message>
add initial presentation for moudul 09 Workspaces
</commit_message>
<xml_diff>
--- a/Modul_09_Workspaces/Workspaces.pptx
+++ b/Modul_09_Workspaces/Workspaces.pptx
@@ -5,10 +5,15 @@
     <p:sldMasterId id="2147483648" r:id="rId1"/>
   </p:sldMasterIdLst>
   <p:notesMasterIdLst>
-    <p:notesMasterId r:id="rId3"/>
+    <p:notesMasterId r:id="rId8"/>
   </p:notesMasterIdLst>
   <p:sldIdLst>
     <p:sldId id="257" r:id="rId2"/>
+    <p:sldId id="258" r:id="rId3"/>
+    <p:sldId id="259" r:id="rId4"/>
+    <p:sldId id="260" r:id="rId5"/>
+    <p:sldId id="262" r:id="rId6"/>
+    <p:sldId id="261" r:id="rId7"/>
   </p:sldIdLst>
   <p:sldSz cx="12192000" cy="6858000"/>
   <p:notesSz cx="6858000" cy="9144000"/>
@@ -197,7 +202,7 @@
           <a:p>
             <a:fld id="{E9DAB8B5-B9A3-426D-91D9-D7966B0F2B79}" type="datetimeFigureOut">
               <a:rPr lang="de-DE" smtClean="0"/>
-              <a:t>13.11.2021</a:t>
+              <a:t>20.11.2021</a:t>
             </a:fld>
             <a:endParaRPr lang="de-DE"/>
           </a:p>
@@ -680,7 +685,7 @@
           <a:p>
             <a:fld id="{6CBA03CC-73C5-46A8-8DFB-B5DC4577D8E2}" type="datetimeFigureOut">
               <a:rPr lang="de-DE" smtClean="0"/>
-              <a:t>13.11.2021</a:t>
+              <a:t>20.11.2021</a:t>
             </a:fld>
             <a:endParaRPr lang="de-DE"/>
           </a:p>
@@ -850,7 +855,7 @@
           <a:p>
             <a:fld id="{6CBA03CC-73C5-46A8-8DFB-B5DC4577D8E2}" type="datetimeFigureOut">
               <a:rPr lang="de-DE" smtClean="0"/>
-              <a:t>13.11.2021</a:t>
+              <a:t>20.11.2021</a:t>
             </a:fld>
             <a:endParaRPr lang="de-DE"/>
           </a:p>
@@ -1030,7 +1035,7 @@
           <a:p>
             <a:fld id="{6CBA03CC-73C5-46A8-8DFB-B5DC4577D8E2}" type="datetimeFigureOut">
               <a:rPr lang="de-DE" smtClean="0"/>
-              <a:t>13.11.2021</a:t>
+              <a:t>20.11.2021</a:t>
             </a:fld>
             <a:endParaRPr lang="de-DE"/>
           </a:p>
@@ -1200,7 +1205,7 @@
           <a:p>
             <a:fld id="{6CBA03CC-73C5-46A8-8DFB-B5DC4577D8E2}" type="datetimeFigureOut">
               <a:rPr lang="de-DE" smtClean="0"/>
-              <a:t>13.11.2021</a:t>
+              <a:t>20.11.2021</a:t>
             </a:fld>
             <a:endParaRPr lang="de-DE"/>
           </a:p>
@@ -1446,7 +1451,7 @@
           <a:p>
             <a:fld id="{6CBA03CC-73C5-46A8-8DFB-B5DC4577D8E2}" type="datetimeFigureOut">
               <a:rPr lang="de-DE" smtClean="0"/>
-              <a:t>13.11.2021</a:t>
+              <a:t>20.11.2021</a:t>
             </a:fld>
             <a:endParaRPr lang="de-DE"/>
           </a:p>
@@ -1678,7 +1683,7 @@
           <a:p>
             <a:fld id="{6CBA03CC-73C5-46A8-8DFB-B5DC4577D8E2}" type="datetimeFigureOut">
               <a:rPr lang="de-DE" smtClean="0"/>
-              <a:t>13.11.2021</a:t>
+              <a:t>20.11.2021</a:t>
             </a:fld>
             <a:endParaRPr lang="de-DE"/>
           </a:p>
@@ -2045,7 +2050,7 @@
           <a:p>
             <a:fld id="{6CBA03CC-73C5-46A8-8DFB-B5DC4577D8E2}" type="datetimeFigureOut">
               <a:rPr lang="de-DE" smtClean="0"/>
-              <a:t>13.11.2021</a:t>
+              <a:t>20.11.2021</a:t>
             </a:fld>
             <a:endParaRPr lang="de-DE"/>
           </a:p>
@@ -2163,7 +2168,7 @@
           <a:p>
             <a:fld id="{6CBA03CC-73C5-46A8-8DFB-B5DC4577D8E2}" type="datetimeFigureOut">
               <a:rPr lang="de-DE" smtClean="0"/>
-              <a:t>13.11.2021</a:t>
+              <a:t>20.11.2021</a:t>
             </a:fld>
             <a:endParaRPr lang="de-DE"/>
           </a:p>
@@ -2258,7 +2263,7 @@
           <a:p>
             <a:fld id="{6CBA03CC-73C5-46A8-8DFB-B5DC4577D8E2}" type="datetimeFigureOut">
               <a:rPr lang="de-DE" smtClean="0"/>
-              <a:t>13.11.2021</a:t>
+              <a:t>20.11.2021</a:t>
             </a:fld>
             <a:endParaRPr lang="de-DE"/>
           </a:p>
@@ -2535,7 +2540,7 @@
           <a:p>
             <a:fld id="{6CBA03CC-73C5-46A8-8DFB-B5DC4577D8E2}" type="datetimeFigureOut">
               <a:rPr lang="de-DE" smtClean="0"/>
-              <a:t>13.11.2021</a:t>
+              <a:t>20.11.2021</a:t>
             </a:fld>
             <a:endParaRPr lang="de-DE"/>
           </a:p>
@@ -2788,7 +2793,7 @@
           <a:p>
             <a:fld id="{6CBA03CC-73C5-46A8-8DFB-B5DC4577D8E2}" type="datetimeFigureOut">
               <a:rPr lang="de-DE" smtClean="0"/>
-              <a:t>13.11.2021</a:t>
+              <a:t>20.11.2021</a:t>
             </a:fld>
             <a:endParaRPr lang="de-DE"/>
           </a:p>
@@ -3001,7 +3006,7 @@
           <a:p>
             <a:fld id="{6CBA03CC-73C5-46A8-8DFB-B5DC4577D8E2}" type="datetimeFigureOut">
               <a:rPr lang="de-DE" smtClean="0"/>
-              <a:t>13.11.2021</a:t>
+              <a:t>20.11.2021</a:t>
             </a:fld>
             <a:endParaRPr lang="de-DE"/>
           </a:p>
@@ -3422,8 +3427,8 @@
           <a:lstStyle/>
           <a:p>
             <a:r>
-              <a:rPr lang="de-DE" smtClean="0"/>
-              <a:t>Workspace</a:t>
+              <a:rPr lang="de-DE" dirty="0" err="1" smtClean="0"/>
+              <a:t>Workspaces</a:t>
             </a:r>
             <a:endParaRPr lang="de-DE" dirty="0"/>
           </a:p>
@@ -3449,9 +3454,78 @@
           <a:bodyPr/>
           <a:lstStyle/>
           <a:p>
-            <a:pPr marL="0" indent="0">
-              <a:buNone/>
-            </a:pPr>
+            <a:r>
+              <a:rPr lang="de-DE" dirty="0" smtClean="0"/>
+              <a:t>Terraform State wird durch das konfigurierte Backend persistiert</a:t>
+            </a:r>
+          </a:p>
+          <a:p>
+            <a:pPr lvl="1"/>
+            <a:r>
+              <a:rPr lang="de-DE" dirty="0" smtClean="0"/>
+              <a:t>Der State ist genau einem Workspace zugeordnet</a:t>
+            </a:r>
+          </a:p>
+          <a:p>
+            <a:r>
+              <a:rPr lang="de-DE" dirty="0"/>
+              <a:t>Jedes Backend besitzt einen „</a:t>
+            </a:r>
+            <a:r>
+              <a:rPr lang="de-DE" dirty="0" err="1"/>
+              <a:t>default</a:t>
+            </a:r>
+            <a:r>
+              <a:rPr lang="de-DE" dirty="0"/>
+              <a:t>“ Workspace der nicht entfernt werden </a:t>
+            </a:r>
+            <a:r>
+              <a:rPr lang="de-DE" dirty="0" smtClean="0"/>
+              <a:t>kann</a:t>
+            </a:r>
+            <a:endParaRPr lang="de-DE" dirty="0" smtClean="0"/>
+          </a:p>
+          <a:p>
+            <a:r>
+              <a:rPr lang="de-DE" dirty="0"/>
+              <a:t>Einige </a:t>
+            </a:r>
+            <a:r>
+              <a:rPr lang="de-DE" dirty="0" err="1"/>
+              <a:t>Backends</a:t>
+            </a:r>
+            <a:r>
+              <a:rPr lang="de-DE" dirty="0"/>
+              <a:t> erlauben das Anlegen mehrerer </a:t>
+            </a:r>
+            <a:r>
+              <a:rPr lang="de-DE" dirty="0" err="1"/>
+              <a:t>Workspaces</a:t>
+            </a:r>
+            <a:r>
+              <a:rPr lang="de-DE" dirty="0"/>
+              <a:t> zu einer Konfiguration</a:t>
+            </a:r>
+          </a:p>
+          <a:p>
+            <a:pPr lvl="1"/>
+            <a:r>
+              <a:rPr lang="de-DE" dirty="0"/>
+              <a:t>Jeder Workspace hat seinen eigenen </a:t>
+            </a:r>
+            <a:r>
+              <a:rPr lang="de-DE" dirty="0" smtClean="0"/>
+              <a:t>State</a:t>
+            </a:r>
+          </a:p>
+          <a:p>
+            <a:pPr lvl="1"/>
+            <a:r>
+              <a:rPr lang="de-DE" dirty="0" smtClean="0"/>
+              <a:t>Ermöglicht das mehrfache erstellen der Ressourcen einer Konfiguration mit einem Backend</a:t>
+            </a:r>
+          </a:p>
+          <a:p>
             <a:endParaRPr lang="de-DE" dirty="0" smtClean="0"/>
           </a:p>
         </p:txBody>
@@ -3473,6 +3547,2146 @@
       </p:par>
     </p:tnLst>
   </p:timing>
+</p:sld>
+</file>
+
+<file path=ppt/slides/slide2.xml><?xml version="1.0" encoding="utf-8"?>
+<p:sld xmlns:a="http://schemas.openxmlformats.org/drawingml/2006/main" xmlns:r="http://schemas.openxmlformats.org/officeDocument/2006/relationships" xmlns:p="http://schemas.openxmlformats.org/presentationml/2006/main">
+  <p:cSld>
+    <p:spTree>
+      <p:nvGrpSpPr>
+        <p:cNvPr id="1" name=""/>
+        <p:cNvGrpSpPr/>
+        <p:nvPr/>
+      </p:nvGrpSpPr>
+      <p:grpSpPr>
+        <a:xfrm>
+          <a:off x="0" y="0"/>
+          <a:ext cx="0" cy="0"/>
+          <a:chOff x="0" y="0"/>
+          <a:chExt cx="0" cy="0"/>
+        </a:xfrm>
+      </p:grpSpPr>
+      <p:sp>
+        <p:nvSpPr>
+          <p:cNvPr id="2" name="Titel 1"/>
+          <p:cNvSpPr>
+            <a:spLocks noGrp="1"/>
+          </p:cNvSpPr>
+          <p:nvPr>
+            <p:ph type="title"/>
+          </p:nvPr>
+        </p:nvSpPr>
+        <p:spPr/>
+        <p:txBody>
+          <a:bodyPr/>
+          <a:lstStyle/>
+          <a:p>
+            <a:r>
+              <a:rPr lang="de-DE" dirty="0" err="1" smtClean="0"/>
+              <a:t>Workspaces</a:t>
+            </a:r>
+            <a:r>
+              <a:rPr lang="de-DE" dirty="0" smtClean="0"/>
+              <a:t> im lokalen Backend</a:t>
+            </a:r>
+            <a:endParaRPr lang="de-DE" dirty="0"/>
+          </a:p>
+        </p:txBody>
+      </p:sp>
+      <p:pic>
+        <p:nvPicPr>
+          <p:cNvPr id="4" name="Grafik 3"/>
+          <p:cNvPicPr>
+            <a:picLocks noChangeAspect="1"/>
+          </p:cNvPicPr>
+          <p:nvPr/>
+        </p:nvPicPr>
+        <p:blipFill>
+          <a:blip r:embed="rId2"/>
+          <a:stretch>
+            <a:fillRect/>
+          </a:stretch>
+        </p:blipFill>
+        <p:spPr>
+          <a:xfrm>
+            <a:off x="983720" y="1926166"/>
+            <a:ext cx="4150799" cy="3966633"/>
+          </a:xfrm>
+          <a:prstGeom prst="rect">
+            <a:avLst/>
+          </a:prstGeom>
+        </p:spPr>
+      </p:pic>
+      <p:sp>
+        <p:nvSpPr>
+          <p:cNvPr id="6" name="Textfeld 5"/>
+          <p:cNvSpPr txBox="1"/>
+          <p:nvPr/>
+        </p:nvSpPr>
+        <p:spPr>
+          <a:xfrm>
+            <a:off x="5888618" y="5002867"/>
+            <a:ext cx="3870547" cy="461665"/>
+          </a:xfrm>
+          <a:prstGeom prst="rect">
+            <a:avLst/>
+          </a:prstGeom>
+          <a:noFill/>
+        </p:spPr>
+        <p:txBody>
+          <a:bodyPr wrap="none" rtlCol="0">
+            <a:spAutoFit/>
+          </a:bodyPr>
+          <a:lstStyle/>
+          <a:p>
+            <a:r>
+              <a:rPr lang="de-DE" sz="2400" b="1" dirty="0" smtClean="0"/>
+              <a:t>State des Default-Workspace</a:t>
+            </a:r>
+            <a:endParaRPr lang="de-DE" b="1" dirty="0"/>
+          </a:p>
+        </p:txBody>
+      </p:sp>
+      <p:cxnSp>
+        <p:nvCxnSpPr>
+          <p:cNvPr id="7" name="Gerade Verbindung mit Pfeil 6"/>
+          <p:cNvCxnSpPr/>
+          <p:nvPr/>
+        </p:nvCxnSpPr>
+        <p:spPr>
+          <a:xfrm flipH="1">
+            <a:off x="3309392" y="5233700"/>
+            <a:ext cx="2363275" cy="0"/>
+          </a:xfrm>
+          <a:prstGeom prst="straightConnector1">
+            <a:avLst/>
+          </a:prstGeom>
+          <a:ln w="76200">
+            <a:solidFill>
+              <a:schemeClr val="accent1">
+                <a:lumMod val="60000"/>
+                <a:lumOff val="40000"/>
+              </a:schemeClr>
+            </a:solidFill>
+            <a:tailEnd type="triangle"/>
+          </a:ln>
+        </p:spPr>
+        <p:style>
+          <a:lnRef idx="1">
+            <a:schemeClr val="accent1"/>
+          </a:lnRef>
+          <a:fillRef idx="0">
+            <a:schemeClr val="accent1"/>
+          </a:fillRef>
+          <a:effectRef idx="0">
+            <a:schemeClr val="accent1"/>
+          </a:effectRef>
+          <a:fontRef idx="minor">
+            <a:schemeClr val="tx1"/>
+          </a:fontRef>
+        </p:style>
+      </p:cxnSp>
+      <p:sp>
+        <p:nvSpPr>
+          <p:cNvPr id="10" name="Textfeld 9"/>
+          <p:cNvSpPr txBox="1"/>
+          <p:nvPr/>
+        </p:nvSpPr>
+        <p:spPr>
+          <a:xfrm>
+            <a:off x="6096000" y="3523434"/>
+            <a:ext cx="3416833" cy="461665"/>
+          </a:xfrm>
+          <a:prstGeom prst="rect">
+            <a:avLst/>
+          </a:prstGeom>
+          <a:noFill/>
+        </p:spPr>
+        <p:txBody>
+          <a:bodyPr wrap="none" rtlCol="0">
+            <a:spAutoFit/>
+          </a:bodyPr>
+          <a:lstStyle/>
+          <a:p>
+            <a:r>
+              <a:rPr lang="de-DE" sz="2400" b="1" dirty="0" smtClean="0"/>
+              <a:t>State des test-Workspace</a:t>
+            </a:r>
+            <a:endParaRPr lang="de-DE" b="1" dirty="0"/>
+          </a:p>
+        </p:txBody>
+      </p:sp>
+      <p:cxnSp>
+        <p:nvCxnSpPr>
+          <p:cNvPr id="11" name="Gerade Verbindung mit Pfeil 10"/>
+          <p:cNvCxnSpPr/>
+          <p:nvPr/>
+        </p:nvCxnSpPr>
+        <p:spPr>
+          <a:xfrm flipH="1">
+            <a:off x="3634844" y="3755567"/>
+            <a:ext cx="2363275" cy="0"/>
+          </a:xfrm>
+          <a:prstGeom prst="straightConnector1">
+            <a:avLst/>
+          </a:prstGeom>
+          <a:ln w="76200">
+            <a:solidFill>
+              <a:schemeClr val="accent1">
+                <a:lumMod val="60000"/>
+                <a:lumOff val="40000"/>
+              </a:schemeClr>
+            </a:solidFill>
+            <a:tailEnd type="triangle"/>
+          </a:ln>
+        </p:spPr>
+        <p:style>
+          <a:lnRef idx="1">
+            <a:schemeClr val="accent1"/>
+          </a:lnRef>
+          <a:fillRef idx="0">
+            <a:schemeClr val="accent1"/>
+          </a:fillRef>
+          <a:effectRef idx="0">
+            <a:schemeClr val="accent1"/>
+          </a:effectRef>
+          <a:fontRef idx="minor">
+            <a:schemeClr val="tx1"/>
+          </a:fontRef>
+        </p:style>
+      </p:cxnSp>
+      <p:sp>
+        <p:nvSpPr>
+          <p:cNvPr id="12" name="Textfeld 11"/>
+          <p:cNvSpPr txBox="1"/>
+          <p:nvPr/>
+        </p:nvSpPr>
+        <p:spPr>
+          <a:xfrm>
+            <a:off x="6269617" y="2685241"/>
+            <a:ext cx="3395353" cy="461665"/>
+          </a:xfrm>
+          <a:prstGeom prst="rect">
+            <a:avLst/>
+          </a:prstGeom>
+          <a:noFill/>
+        </p:spPr>
+        <p:txBody>
+          <a:bodyPr wrap="none" rtlCol="0">
+            <a:spAutoFit/>
+          </a:bodyPr>
+          <a:lstStyle/>
+          <a:p>
+            <a:r>
+              <a:rPr lang="de-DE" sz="2400" b="1" dirty="0" smtClean="0"/>
+              <a:t>State des </a:t>
+            </a:r>
+            <a:r>
+              <a:rPr lang="de-DE" sz="2400" b="1" dirty="0" err="1" smtClean="0"/>
+              <a:t>dev</a:t>
+            </a:r>
+            <a:r>
+              <a:rPr lang="de-DE" sz="2400" b="1" dirty="0" smtClean="0"/>
+              <a:t>-Workspace</a:t>
+            </a:r>
+            <a:endParaRPr lang="de-DE" b="1" dirty="0"/>
+          </a:p>
+        </p:txBody>
+      </p:sp>
+      <p:cxnSp>
+        <p:nvCxnSpPr>
+          <p:cNvPr id="13" name="Gerade Verbindung mit Pfeil 12"/>
+          <p:cNvCxnSpPr/>
+          <p:nvPr/>
+        </p:nvCxnSpPr>
+        <p:spPr>
+          <a:xfrm flipH="1">
+            <a:off x="3732725" y="2939234"/>
+            <a:ext cx="2363275" cy="0"/>
+          </a:xfrm>
+          <a:prstGeom prst="straightConnector1">
+            <a:avLst/>
+          </a:prstGeom>
+          <a:ln w="76200">
+            <a:solidFill>
+              <a:schemeClr val="accent1">
+                <a:lumMod val="60000"/>
+                <a:lumOff val="40000"/>
+              </a:schemeClr>
+            </a:solidFill>
+            <a:tailEnd type="triangle"/>
+          </a:ln>
+        </p:spPr>
+        <p:style>
+          <a:lnRef idx="1">
+            <a:schemeClr val="accent1"/>
+          </a:lnRef>
+          <a:fillRef idx="0">
+            <a:schemeClr val="accent1"/>
+          </a:fillRef>
+          <a:effectRef idx="0">
+            <a:schemeClr val="accent1"/>
+          </a:effectRef>
+          <a:fontRef idx="minor">
+            <a:schemeClr val="tx1"/>
+          </a:fontRef>
+        </p:style>
+      </p:cxnSp>
+    </p:spTree>
+    <p:extLst>
+      <p:ext uri="{BB962C8B-B14F-4D97-AF65-F5344CB8AC3E}">
+        <p14:creationId xmlns:p14="http://schemas.microsoft.com/office/powerpoint/2010/main" val="2421755747"/>
+      </p:ext>
+    </p:extLst>
+  </p:cSld>
+  <p:clrMapOvr>
+    <a:masterClrMapping/>
+  </p:clrMapOvr>
+</p:sld>
+</file>
+
+<file path=ppt/slides/slide3.xml><?xml version="1.0" encoding="utf-8"?>
+<p:sld xmlns:a="http://schemas.openxmlformats.org/drawingml/2006/main" xmlns:r="http://schemas.openxmlformats.org/officeDocument/2006/relationships" xmlns:p="http://schemas.openxmlformats.org/presentationml/2006/main">
+  <p:cSld>
+    <p:spTree>
+      <p:nvGrpSpPr>
+        <p:cNvPr id="1" name=""/>
+        <p:cNvGrpSpPr/>
+        <p:nvPr/>
+      </p:nvGrpSpPr>
+      <p:grpSpPr>
+        <a:xfrm>
+          <a:off x="0" y="0"/>
+          <a:ext cx="0" cy="0"/>
+          <a:chOff x="0" y="0"/>
+          <a:chExt cx="0" cy="0"/>
+        </a:xfrm>
+      </p:grpSpPr>
+      <p:sp>
+        <p:nvSpPr>
+          <p:cNvPr id="2" name="Titel 1"/>
+          <p:cNvSpPr>
+            <a:spLocks noGrp="1"/>
+          </p:cNvSpPr>
+          <p:nvPr>
+            <p:ph type="title"/>
+          </p:nvPr>
+        </p:nvSpPr>
+        <p:spPr/>
+        <p:txBody>
+          <a:bodyPr/>
+          <a:lstStyle/>
+          <a:p>
+            <a:r>
+              <a:rPr lang="de-DE" dirty="0" smtClean="0"/>
+              <a:t>CLI - </a:t>
+            </a:r>
+            <a:r>
+              <a:rPr lang="de-DE" dirty="0" err="1" smtClean="0"/>
+              <a:t>terrafrom</a:t>
+            </a:r>
+            <a:r>
+              <a:rPr lang="de-DE" dirty="0" smtClean="0"/>
+              <a:t> </a:t>
+            </a:r>
+            <a:r>
+              <a:rPr lang="de-DE" dirty="0" err="1" smtClean="0"/>
+              <a:t>workspace</a:t>
+            </a:r>
+            <a:endParaRPr lang="de-DE" dirty="0"/>
+          </a:p>
+        </p:txBody>
+      </p:sp>
+      <p:sp>
+        <p:nvSpPr>
+          <p:cNvPr id="14" name="Inhaltsplatzhalter 2"/>
+          <p:cNvSpPr>
+            <a:spLocks noGrp="1"/>
+          </p:cNvSpPr>
+          <p:nvPr>
+            <p:ph idx="1"/>
+          </p:nvPr>
+        </p:nvSpPr>
+        <p:spPr>
+          <a:xfrm>
+            <a:off x="838200" y="1825625"/>
+            <a:ext cx="10515600" cy="4351338"/>
+          </a:xfrm>
+        </p:spPr>
+        <p:txBody>
+          <a:bodyPr>
+            <a:normAutofit/>
+          </a:bodyPr>
+          <a:lstStyle/>
+          <a:p>
+            <a:r>
+              <a:rPr lang="de-DE" dirty="0" smtClean="0"/>
+              <a:t>Anlegen eines neuen Workspace</a:t>
+            </a:r>
+          </a:p>
+          <a:p>
+            <a:endParaRPr lang="de-DE" dirty="0" smtClean="0"/>
+          </a:p>
+          <a:p>
+            <a:endParaRPr lang="de-DE" dirty="0"/>
+          </a:p>
+          <a:p>
+            <a:r>
+              <a:rPr lang="de-DE" dirty="0" smtClean="0"/>
+              <a:t>Wechseln des ausgewählten Workspace</a:t>
+            </a:r>
+          </a:p>
+          <a:p>
+            <a:endParaRPr lang="de-DE" dirty="0" smtClean="0"/>
+          </a:p>
+          <a:p>
+            <a:endParaRPr lang="de-DE" dirty="0"/>
+          </a:p>
+          <a:p>
+            <a:r>
+              <a:rPr lang="de-DE" dirty="0" smtClean="0"/>
+              <a:t>Anzeige des aktuellen Workspace</a:t>
+            </a:r>
+          </a:p>
+          <a:p>
+            <a:endParaRPr lang="de-DE" dirty="0"/>
+          </a:p>
+          <a:p>
+            <a:endParaRPr lang="de-DE" dirty="0" smtClean="0"/>
+          </a:p>
+        </p:txBody>
+      </p:sp>
+      <p:sp>
+        <p:nvSpPr>
+          <p:cNvPr id="8" name="Rechteck 7"/>
+          <p:cNvSpPr/>
+          <p:nvPr/>
+        </p:nvSpPr>
+        <p:spPr>
+          <a:xfrm>
+            <a:off x="1295400" y="2533134"/>
+            <a:ext cx="4089400" cy="369332"/>
+          </a:xfrm>
+          <a:prstGeom prst="rect">
+            <a:avLst/>
+          </a:prstGeom>
+          <a:solidFill>
+            <a:schemeClr val="tx1"/>
+          </a:solidFill>
+        </p:spPr>
+        <p:txBody>
+          <a:bodyPr wrap="square">
+            <a:spAutoFit/>
+          </a:bodyPr>
+          <a:lstStyle/>
+          <a:p>
+            <a:r>
+              <a:rPr lang="de-DE" dirty="0" smtClean="0">
+                <a:solidFill>
+                  <a:schemeClr val="bg1">
+                    <a:lumMod val="75000"/>
+                  </a:schemeClr>
+                </a:solidFill>
+              </a:rPr>
+              <a:t>&gt; </a:t>
+            </a:r>
+            <a:r>
+              <a:rPr lang="de-DE" dirty="0" err="1" smtClean="0">
+                <a:solidFill>
+                  <a:schemeClr val="bg1">
+                    <a:lumMod val="75000"/>
+                  </a:schemeClr>
+                </a:solidFill>
+              </a:rPr>
+              <a:t>terraform</a:t>
+            </a:r>
+            <a:r>
+              <a:rPr lang="de-DE" dirty="0" smtClean="0">
+                <a:solidFill>
+                  <a:schemeClr val="bg1">
+                    <a:lumMod val="75000"/>
+                  </a:schemeClr>
+                </a:solidFill>
+              </a:rPr>
+              <a:t> </a:t>
+            </a:r>
+            <a:r>
+              <a:rPr lang="de-DE" dirty="0" err="1">
+                <a:solidFill>
+                  <a:schemeClr val="bg1">
+                    <a:lumMod val="75000"/>
+                  </a:schemeClr>
+                </a:solidFill>
+              </a:rPr>
+              <a:t>workspace</a:t>
+            </a:r>
+            <a:r>
+              <a:rPr lang="de-DE" dirty="0">
+                <a:solidFill>
+                  <a:schemeClr val="bg1">
+                    <a:lumMod val="75000"/>
+                  </a:schemeClr>
+                </a:solidFill>
+              </a:rPr>
+              <a:t> </a:t>
+            </a:r>
+            <a:r>
+              <a:rPr lang="de-DE" dirty="0" err="1">
+                <a:solidFill>
+                  <a:schemeClr val="bg1">
+                    <a:lumMod val="75000"/>
+                  </a:schemeClr>
+                </a:solidFill>
+              </a:rPr>
+              <a:t>new</a:t>
+            </a:r>
+            <a:r>
+              <a:rPr lang="de-DE" dirty="0">
+                <a:solidFill>
+                  <a:schemeClr val="bg1">
+                    <a:lumMod val="75000"/>
+                  </a:schemeClr>
+                </a:solidFill>
+              </a:rPr>
+              <a:t> </a:t>
+            </a:r>
+            <a:r>
+              <a:rPr lang="de-DE" dirty="0" err="1" smtClean="0">
+                <a:solidFill>
+                  <a:schemeClr val="bg1">
+                    <a:lumMod val="75000"/>
+                  </a:schemeClr>
+                </a:solidFill>
+              </a:rPr>
+              <a:t>feature</a:t>
+            </a:r>
+            <a:endParaRPr lang="de-DE" dirty="0">
+              <a:solidFill>
+                <a:schemeClr val="bg1">
+                  <a:lumMod val="75000"/>
+                </a:schemeClr>
+              </a:solidFill>
+            </a:endParaRPr>
+          </a:p>
+        </p:txBody>
+      </p:sp>
+      <p:sp>
+        <p:nvSpPr>
+          <p:cNvPr id="15" name="Rechteck 14"/>
+          <p:cNvSpPr/>
+          <p:nvPr/>
+        </p:nvSpPr>
+        <p:spPr>
+          <a:xfrm>
+            <a:off x="1295400" y="3985716"/>
+            <a:ext cx="4089400" cy="369332"/>
+          </a:xfrm>
+          <a:prstGeom prst="rect">
+            <a:avLst/>
+          </a:prstGeom>
+          <a:solidFill>
+            <a:schemeClr val="tx1"/>
+          </a:solidFill>
+        </p:spPr>
+        <p:txBody>
+          <a:bodyPr wrap="square">
+            <a:spAutoFit/>
+          </a:bodyPr>
+          <a:lstStyle/>
+          <a:p>
+            <a:r>
+              <a:rPr lang="de-DE" dirty="0" smtClean="0">
+                <a:solidFill>
+                  <a:schemeClr val="bg1">
+                    <a:lumMod val="75000"/>
+                  </a:schemeClr>
+                </a:solidFill>
+              </a:rPr>
+              <a:t>&gt; </a:t>
+            </a:r>
+            <a:r>
+              <a:rPr lang="de-DE" dirty="0" err="1" smtClean="0">
+                <a:solidFill>
+                  <a:schemeClr val="bg1">
+                    <a:lumMod val="75000"/>
+                  </a:schemeClr>
+                </a:solidFill>
+              </a:rPr>
+              <a:t>terraform</a:t>
+            </a:r>
+            <a:r>
+              <a:rPr lang="de-DE" dirty="0" smtClean="0">
+                <a:solidFill>
+                  <a:schemeClr val="bg1">
+                    <a:lumMod val="75000"/>
+                  </a:schemeClr>
+                </a:solidFill>
+              </a:rPr>
+              <a:t> </a:t>
+            </a:r>
+            <a:r>
+              <a:rPr lang="de-DE" dirty="0" err="1">
+                <a:solidFill>
+                  <a:schemeClr val="bg1">
+                    <a:lumMod val="75000"/>
+                  </a:schemeClr>
+                </a:solidFill>
+              </a:rPr>
+              <a:t>workspace</a:t>
+            </a:r>
+            <a:r>
+              <a:rPr lang="de-DE" dirty="0">
+                <a:solidFill>
+                  <a:schemeClr val="bg1">
+                    <a:lumMod val="75000"/>
+                  </a:schemeClr>
+                </a:solidFill>
+              </a:rPr>
+              <a:t> </a:t>
+            </a:r>
+            <a:r>
+              <a:rPr lang="de-DE" dirty="0" err="1" smtClean="0">
+                <a:solidFill>
+                  <a:schemeClr val="bg1">
+                    <a:lumMod val="75000"/>
+                  </a:schemeClr>
+                </a:solidFill>
+              </a:rPr>
+              <a:t>select</a:t>
+            </a:r>
+            <a:r>
+              <a:rPr lang="de-DE" dirty="0" smtClean="0">
+                <a:solidFill>
+                  <a:schemeClr val="bg1">
+                    <a:lumMod val="75000"/>
+                  </a:schemeClr>
+                </a:solidFill>
+              </a:rPr>
+              <a:t> </a:t>
+            </a:r>
+            <a:r>
+              <a:rPr lang="de-DE" dirty="0" err="1" smtClean="0">
+                <a:solidFill>
+                  <a:schemeClr val="bg1">
+                    <a:lumMod val="75000"/>
+                  </a:schemeClr>
+                </a:solidFill>
+              </a:rPr>
+              <a:t>default</a:t>
+            </a:r>
+            <a:endParaRPr lang="de-DE" dirty="0">
+              <a:solidFill>
+                <a:schemeClr val="bg1">
+                  <a:lumMod val="75000"/>
+                </a:schemeClr>
+              </a:solidFill>
+            </a:endParaRPr>
+          </a:p>
+        </p:txBody>
+      </p:sp>
+      <p:sp>
+        <p:nvSpPr>
+          <p:cNvPr id="16" name="Rechteck 15"/>
+          <p:cNvSpPr/>
+          <p:nvPr/>
+        </p:nvSpPr>
+        <p:spPr>
+          <a:xfrm>
+            <a:off x="1295400" y="5577449"/>
+            <a:ext cx="4089400" cy="369332"/>
+          </a:xfrm>
+          <a:prstGeom prst="rect">
+            <a:avLst/>
+          </a:prstGeom>
+          <a:solidFill>
+            <a:schemeClr val="tx1"/>
+          </a:solidFill>
+        </p:spPr>
+        <p:txBody>
+          <a:bodyPr wrap="square">
+            <a:spAutoFit/>
+          </a:bodyPr>
+          <a:lstStyle/>
+          <a:p>
+            <a:r>
+              <a:rPr lang="de-DE" dirty="0" smtClean="0">
+                <a:solidFill>
+                  <a:schemeClr val="bg1">
+                    <a:lumMod val="75000"/>
+                  </a:schemeClr>
+                </a:solidFill>
+              </a:rPr>
+              <a:t>&gt; </a:t>
+            </a:r>
+            <a:r>
+              <a:rPr lang="de-DE" dirty="0" err="1" smtClean="0">
+                <a:solidFill>
+                  <a:schemeClr val="bg1">
+                    <a:lumMod val="75000"/>
+                  </a:schemeClr>
+                </a:solidFill>
+              </a:rPr>
+              <a:t>terraform</a:t>
+            </a:r>
+            <a:r>
+              <a:rPr lang="de-DE" dirty="0" smtClean="0">
+                <a:solidFill>
+                  <a:schemeClr val="bg1">
+                    <a:lumMod val="75000"/>
+                  </a:schemeClr>
+                </a:solidFill>
+              </a:rPr>
+              <a:t> </a:t>
+            </a:r>
+            <a:r>
+              <a:rPr lang="de-DE" dirty="0" err="1">
+                <a:solidFill>
+                  <a:schemeClr val="bg1">
+                    <a:lumMod val="75000"/>
+                  </a:schemeClr>
+                </a:solidFill>
+              </a:rPr>
+              <a:t>workspace</a:t>
+            </a:r>
+            <a:r>
+              <a:rPr lang="de-DE" dirty="0">
+                <a:solidFill>
+                  <a:schemeClr val="bg1">
+                    <a:lumMod val="75000"/>
+                  </a:schemeClr>
+                </a:solidFill>
+              </a:rPr>
+              <a:t> </a:t>
+            </a:r>
+            <a:r>
+              <a:rPr lang="de-DE" dirty="0" err="1" smtClean="0">
+                <a:solidFill>
+                  <a:schemeClr val="bg1">
+                    <a:lumMod val="75000"/>
+                  </a:schemeClr>
+                </a:solidFill>
+              </a:rPr>
+              <a:t>show</a:t>
+            </a:r>
+            <a:endParaRPr lang="de-DE" dirty="0">
+              <a:solidFill>
+                <a:schemeClr val="bg1">
+                  <a:lumMod val="75000"/>
+                </a:schemeClr>
+              </a:solidFill>
+            </a:endParaRPr>
+          </a:p>
+        </p:txBody>
+      </p:sp>
+    </p:spTree>
+    <p:extLst>
+      <p:ext uri="{BB962C8B-B14F-4D97-AF65-F5344CB8AC3E}">
+        <p14:creationId xmlns:p14="http://schemas.microsoft.com/office/powerpoint/2010/main" val="273782413"/>
+      </p:ext>
+    </p:extLst>
+  </p:cSld>
+  <p:clrMapOvr>
+    <a:masterClrMapping/>
+  </p:clrMapOvr>
+</p:sld>
+</file>
+
+<file path=ppt/slides/slide4.xml><?xml version="1.0" encoding="utf-8"?>
+<p:sld xmlns:a="http://schemas.openxmlformats.org/drawingml/2006/main" xmlns:r="http://schemas.openxmlformats.org/officeDocument/2006/relationships" xmlns:p="http://schemas.openxmlformats.org/presentationml/2006/main">
+  <p:cSld>
+    <p:spTree>
+      <p:nvGrpSpPr>
+        <p:cNvPr id="1" name=""/>
+        <p:cNvGrpSpPr/>
+        <p:nvPr/>
+      </p:nvGrpSpPr>
+      <p:grpSpPr>
+        <a:xfrm>
+          <a:off x="0" y="0"/>
+          <a:ext cx="0" cy="0"/>
+          <a:chOff x="0" y="0"/>
+          <a:chExt cx="0" cy="0"/>
+        </a:xfrm>
+      </p:grpSpPr>
+      <p:sp>
+        <p:nvSpPr>
+          <p:cNvPr id="2" name="Titel 1"/>
+          <p:cNvSpPr>
+            <a:spLocks noGrp="1"/>
+          </p:cNvSpPr>
+          <p:nvPr>
+            <p:ph type="title"/>
+          </p:nvPr>
+        </p:nvSpPr>
+        <p:spPr>
+          <a:xfrm>
+            <a:off x="838200" y="390525"/>
+            <a:ext cx="10515600" cy="1325563"/>
+          </a:xfrm>
+        </p:spPr>
+        <p:txBody>
+          <a:bodyPr/>
+          <a:lstStyle/>
+          <a:p>
+            <a:r>
+              <a:rPr lang="de-DE" dirty="0" smtClean="0"/>
+              <a:t>CLI - </a:t>
+            </a:r>
+            <a:r>
+              <a:rPr lang="de-DE" dirty="0" err="1" smtClean="0"/>
+              <a:t>terrafrom</a:t>
+            </a:r>
+            <a:r>
+              <a:rPr lang="de-DE" dirty="0" smtClean="0"/>
+              <a:t> </a:t>
+            </a:r>
+            <a:r>
+              <a:rPr lang="de-DE" dirty="0" err="1" smtClean="0"/>
+              <a:t>workspace</a:t>
+            </a:r>
+            <a:r>
+              <a:rPr lang="de-DE" dirty="0" smtClean="0"/>
+              <a:t> 2</a:t>
+            </a:r>
+            <a:endParaRPr lang="de-DE" dirty="0"/>
+          </a:p>
+        </p:txBody>
+      </p:sp>
+      <p:sp>
+        <p:nvSpPr>
+          <p:cNvPr id="14" name="Inhaltsplatzhalter 2"/>
+          <p:cNvSpPr>
+            <a:spLocks noGrp="1"/>
+          </p:cNvSpPr>
+          <p:nvPr>
+            <p:ph idx="1"/>
+          </p:nvPr>
+        </p:nvSpPr>
+        <p:spPr>
+          <a:xfrm>
+            <a:off x="838200" y="1825625"/>
+            <a:ext cx="10515600" cy="4351338"/>
+          </a:xfrm>
+        </p:spPr>
+        <p:txBody>
+          <a:bodyPr>
+            <a:normAutofit/>
+          </a:bodyPr>
+          <a:lstStyle/>
+          <a:p>
+            <a:r>
+              <a:rPr lang="de-DE" dirty="0"/>
+              <a:t>Auflistung aller </a:t>
+            </a:r>
+            <a:r>
+              <a:rPr lang="de-DE" dirty="0" err="1"/>
+              <a:t>Workspaces</a:t>
+            </a:r>
+            <a:endParaRPr lang="de-DE" dirty="0"/>
+          </a:p>
+          <a:p>
+            <a:endParaRPr lang="de-DE" dirty="0" smtClean="0"/>
+          </a:p>
+          <a:p>
+            <a:endParaRPr lang="de-DE" dirty="0"/>
+          </a:p>
+          <a:p>
+            <a:r>
+              <a:rPr lang="de-DE" dirty="0"/>
+              <a:t>Löschen eines Workspace</a:t>
+            </a:r>
+          </a:p>
+          <a:p>
+            <a:endParaRPr lang="de-DE" dirty="0"/>
+          </a:p>
+          <a:p>
+            <a:endParaRPr lang="de-DE" dirty="0" smtClean="0"/>
+          </a:p>
+        </p:txBody>
+      </p:sp>
+      <p:sp>
+        <p:nvSpPr>
+          <p:cNvPr id="8" name="Rechteck 7"/>
+          <p:cNvSpPr/>
+          <p:nvPr/>
+        </p:nvSpPr>
+        <p:spPr>
+          <a:xfrm>
+            <a:off x="1429768" y="4001294"/>
+            <a:ext cx="3526671" cy="369332"/>
+          </a:xfrm>
+          <a:prstGeom prst="rect">
+            <a:avLst/>
+          </a:prstGeom>
+          <a:solidFill>
+            <a:schemeClr val="tx1"/>
+          </a:solidFill>
+        </p:spPr>
+        <p:txBody>
+          <a:bodyPr wrap="none">
+            <a:spAutoFit/>
+          </a:bodyPr>
+          <a:lstStyle/>
+          <a:p>
+            <a:r>
+              <a:rPr lang="de-DE" dirty="0" err="1">
+                <a:solidFill>
+                  <a:schemeClr val="bg1">
+                    <a:lumMod val="75000"/>
+                  </a:schemeClr>
+                </a:solidFill>
+              </a:rPr>
+              <a:t>terraform</a:t>
+            </a:r>
+            <a:r>
+              <a:rPr lang="de-DE" dirty="0">
+                <a:solidFill>
+                  <a:schemeClr val="bg1">
+                    <a:lumMod val="75000"/>
+                  </a:schemeClr>
+                </a:solidFill>
+              </a:rPr>
+              <a:t> </a:t>
+            </a:r>
+            <a:r>
+              <a:rPr lang="de-DE" dirty="0" err="1">
+                <a:solidFill>
+                  <a:schemeClr val="bg1">
+                    <a:lumMod val="75000"/>
+                  </a:schemeClr>
+                </a:solidFill>
+              </a:rPr>
+              <a:t>workspace</a:t>
+            </a:r>
+            <a:r>
+              <a:rPr lang="de-DE" dirty="0">
+                <a:solidFill>
+                  <a:schemeClr val="bg1">
+                    <a:lumMod val="75000"/>
+                  </a:schemeClr>
+                </a:solidFill>
+              </a:rPr>
+              <a:t> </a:t>
+            </a:r>
+            <a:r>
+              <a:rPr lang="de-DE" dirty="0" err="1" smtClean="0">
+                <a:solidFill>
+                  <a:schemeClr val="bg1">
+                    <a:lumMod val="75000"/>
+                  </a:schemeClr>
+                </a:solidFill>
+              </a:rPr>
+              <a:t>delete</a:t>
+            </a:r>
+            <a:r>
+              <a:rPr lang="de-DE" dirty="0" smtClean="0">
+                <a:solidFill>
+                  <a:schemeClr val="bg1">
+                    <a:lumMod val="75000"/>
+                  </a:schemeClr>
+                </a:solidFill>
+              </a:rPr>
+              <a:t> </a:t>
+            </a:r>
+            <a:r>
+              <a:rPr lang="de-DE" dirty="0" err="1" smtClean="0">
+                <a:solidFill>
+                  <a:schemeClr val="bg1">
+                    <a:lumMod val="75000"/>
+                  </a:schemeClr>
+                </a:solidFill>
+              </a:rPr>
+              <a:t>feature</a:t>
+            </a:r>
+            <a:endParaRPr lang="de-DE" dirty="0">
+              <a:solidFill>
+                <a:schemeClr val="bg1">
+                  <a:lumMod val="75000"/>
+                </a:schemeClr>
+              </a:solidFill>
+            </a:endParaRPr>
+          </a:p>
+        </p:txBody>
+      </p:sp>
+      <p:sp>
+        <p:nvSpPr>
+          <p:cNvPr id="5" name="Rechteck 4"/>
+          <p:cNvSpPr/>
+          <p:nvPr/>
+        </p:nvSpPr>
+        <p:spPr>
+          <a:xfrm>
+            <a:off x="1473199" y="2406133"/>
+            <a:ext cx="3483239" cy="369332"/>
+          </a:xfrm>
+          <a:prstGeom prst="rect">
+            <a:avLst/>
+          </a:prstGeom>
+          <a:solidFill>
+            <a:schemeClr val="tx1"/>
+          </a:solidFill>
+        </p:spPr>
+        <p:txBody>
+          <a:bodyPr wrap="square">
+            <a:spAutoFit/>
+          </a:bodyPr>
+          <a:lstStyle/>
+          <a:p>
+            <a:r>
+              <a:rPr lang="de-DE" dirty="0" err="1">
+                <a:solidFill>
+                  <a:schemeClr val="bg1">
+                    <a:lumMod val="75000"/>
+                  </a:schemeClr>
+                </a:solidFill>
+              </a:rPr>
+              <a:t>terraform</a:t>
+            </a:r>
+            <a:r>
+              <a:rPr lang="de-DE" dirty="0">
+                <a:solidFill>
+                  <a:schemeClr val="bg1">
+                    <a:lumMod val="75000"/>
+                  </a:schemeClr>
+                </a:solidFill>
+              </a:rPr>
+              <a:t> </a:t>
+            </a:r>
+            <a:r>
+              <a:rPr lang="de-DE" dirty="0" err="1">
+                <a:solidFill>
+                  <a:schemeClr val="bg1">
+                    <a:lumMod val="75000"/>
+                  </a:schemeClr>
+                </a:solidFill>
+              </a:rPr>
+              <a:t>workspace</a:t>
+            </a:r>
+            <a:r>
+              <a:rPr lang="de-DE" dirty="0">
+                <a:solidFill>
+                  <a:schemeClr val="bg1">
+                    <a:lumMod val="75000"/>
+                  </a:schemeClr>
+                </a:solidFill>
+              </a:rPr>
+              <a:t> </a:t>
+            </a:r>
+            <a:r>
+              <a:rPr lang="de-DE" dirty="0" err="1" smtClean="0">
+                <a:solidFill>
+                  <a:schemeClr val="bg1">
+                    <a:lumMod val="75000"/>
+                  </a:schemeClr>
+                </a:solidFill>
+              </a:rPr>
+              <a:t>list</a:t>
+            </a:r>
+            <a:endParaRPr lang="de-DE" dirty="0">
+              <a:solidFill>
+                <a:schemeClr val="bg1">
+                  <a:lumMod val="75000"/>
+                </a:schemeClr>
+              </a:solidFill>
+            </a:endParaRPr>
+          </a:p>
+        </p:txBody>
+      </p:sp>
+      <p:sp>
+        <p:nvSpPr>
+          <p:cNvPr id="3" name="Textfeld 2"/>
+          <p:cNvSpPr txBox="1"/>
+          <p:nvPr/>
+        </p:nvSpPr>
+        <p:spPr>
+          <a:xfrm>
+            <a:off x="838200" y="4766468"/>
+            <a:ext cx="7584705" cy="369332"/>
+          </a:xfrm>
+          <a:prstGeom prst="rect">
+            <a:avLst/>
+          </a:prstGeom>
+          <a:noFill/>
+        </p:spPr>
+        <p:txBody>
+          <a:bodyPr wrap="none" rtlCol="0">
+            <a:spAutoFit/>
+          </a:bodyPr>
+          <a:lstStyle/>
+          <a:p>
+            <a:r>
+              <a:rPr lang="de-DE" dirty="0" smtClean="0"/>
+              <a:t>Führt zu einer Warnung sofern noch Ressourcen im Workspace vorhanden sind</a:t>
+            </a:r>
+            <a:endParaRPr lang="de-DE" dirty="0"/>
+          </a:p>
+        </p:txBody>
+      </p:sp>
+    </p:spTree>
+    <p:extLst>
+      <p:ext uri="{BB962C8B-B14F-4D97-AF65-F5344CB8AC3E}">
+        <p14:creationId xmlns:p14="http://schemas.microsoft.com/office/powerpoint/2010/main" val="3021632839"/>
+      </p:ext>
+    </p:extLst>
+  </p:cSld>
+  <p:clrMapOvr>
+    <a:masterClrMapping/>
+  </p:clrMapOvr>
+</p:sld>
+</file>
+
+<file path=ppt/slides/slide5.xml><?xml version="1.0" encoding="utf-8"?>
+<p:sld xmlns:a="http://schemas.openxmlformats.org/drawingml/2006/main" xmlns:r="http://schemas.openxmlformats.org/officeDocument/2006/relationships" xmlns:p="http://schemas.openxmlformats.org/presentationml/2006/main">
+  <p:cSld>
+    <p:spTree>
+      <p:nvGrpSpPr>
+        <p:cNvPr id="1" name=""/>
+        <p:cNvGrpSpPr/>
+        <p:nvPr/>
+      </p:nvGrpSpPr>
+      <p:grpSpPr>
+        <a:xfrm>
+          <a:off x="0" y="0"/>
+          <a:ext cx="0" cy="0"/>
+          <a:chOff x="0" y="0"/>
+          <a:chExt cx="0" cy="0"/>
+        </a:xfrm>
+      </p:grpSpPr>
+      <p:sp>
+        <p:nvSpPr>
+          <p:cNvPr id="2" name="Titel 1"/>
+          <p:cNvSpPr>
+            <a:spLocks noGrp="1"/>
+          </p:cNvSpPr>
+          <p:nvPr>
+            <p:ph type="title"/>
+          </p:nvPr>
+        </p:nvSpPr>
+        <p:spPr>
+          <a:xfrm>
+            <a:off x="838200" y="390525"/>
+            <a:ext cx="10515600" cy="1325563"/>
+          </a:xfrm>
+        </p:spPr>
+        <p:txBody>
+          <a:bodyPr/>
+          <a:lstStyle/>
+          <a:p>
+            <a:r>
+              <a:rPr lang="de-DE" dirty="0" err="1" smtClean="0"/>
+              <a:t>Current</a:t>
+            </a:r>
+            <a:r>
+              <a:rPr lang="de-DE" dirty="0" smtClean="0"/>
+              <a:t> Workspace - Interpolation</a:t>
+            </a:r>
+            <a:endParaRPr lang="de-DE" dirty="0"/>
+          </a:p>
+        </p:txBody>
+      </p:sp>
+      <p:sp>
+        <p:nvSpPr>
+          <p:cNvPr id="14" name="Inhaltsplatzhalter 2"/>
+          <p:cNvSpPr>
+            <a:spLocks noGrp="1"/>
+          </p:cNvSpPr>
+          <p:nvPr>
+            <p:ph idx="1"/>
+          </p:nvPr>
+        </p:nvSpPr>
+        <p:spPr>
+          <a:xfrm>
+            <a:off x="838200" y="1825625"/>
+            <a:ext cx="10515600" cy="4351338"/>
+          </a:xfrm>
+        </p:spPr>
+        <p:txBody>
+          <a:bodyPr>
+            <a:normAutofit/>
+          </a:bodyPr>
+          <a:lstStyle/>
+          <a:p>
+            <a:r>
+              <a:rPr lang="de-DE" dirty="0" smtClean="0"/>
+              <a:t>Name des aktuellen Workspace kann innerhalb der Konfiguration verwendet werden</a:t>
+            </a:r>
+            <a:endParaRPr lang="de-DE" dirty="0"/>
+          </a:p>
+          <a:p>
+            <a:endParaRPr lang="de-DE" dirty="0" smtClean="0"/>
+          </a:p>
+        </p:txBody>
+      </p:sp>
+      <p:sp>
+        <p:nvSpPr>
+          <p:cNvPr id="4" name="Rectangle 1"/>
+          <p:cNvSpPr>
+            <a:spLocks noChangeArrowheads="1"/>
+          </p:cNvSpPr>
+          <p:nvPr/>
+        </p:nvSpPr>
+        <p:spPr bwMode="auto">
+          <a:xfrm>
+            <a:off x="1905000" y="3201594"/>
+            <a:ext cx="7747000" cy="2554545"/>
+          </a:xfrm>
+          <a:prstGeom prst="rect">
+            <a:avLst/>
+          </a:prstGeom>
+          <a:solidFill>
+            <a:srgbClr val="282C34"/>
+          </a:solidFill>
+          <a:ln>
+            <a:noFill/>
+          </a:ln>
+          <a:effectLst/>
+          <a:extLst>
+            <a:ext uri="{91240B29-F687-4F45-9708-019B960494DF}">
+              <a14:hiddenLine xmlns:a14="http://schemas.microsoft.com/office/drawing/2010/main" w="9525">
+                <a:solidFill>
+                  <a:schemeClr val="tx1"/>
+                </a:solidFill>
+                <a:miter lim="800000"/>
+                <a:headEnd/>
+                <a:tailEnd/>
+              </a14:hiddenLine>
+            </a:ext>
+            <a:ext uri="{AF507438-7753-43E0-B8FC-AC1667EBCBE1}">
+              <a14:hiddenEffects xmlns:a14="http://schemas.microsoft.com/office/drawing/2010/main">
+                <a:effectLst>
+                  <a:outerShdw dist="35921" dir="2700000" algn="ctr" rotWithShape="0">
+                    <a:schemeClr val="bg2"/>
+                  </a:outerShdw>
+                </a:effectLst>
+              </a14:hiddenEffects>
+            </a:ext>
+          </a:extLst>
+        </p:spPr>
+        <p:txBody>
+          <a:bodyPr vert="horz" wrap="square" lIns="91440" tIns="45720" rIns="91440" bIns="45720" numCol="1" anchor="ctr" anchorCtr="0" compatLnSpc="1">
+            <a:prstTxWarp prst="textNoShape">
+              <a:avLst/>
+            </a:prstTxWarp>
+            <a:spAutoFit/>
+          </a:bodyPr>
+          <a:lstStyle/>
+          <a:p>
+            <a:pPr marL="0" marR="0" lvl="0" indent="0" algn="l" defTabSz="914400" rtl="0" eaLnBrk="0" fontAlgn="base" latinLnBrk="0" hangingPunct="0">
+              <a:lnSpc>
+                <a:spcPct val="100000"/>
+              </a:lnSpc>
+              <a:spcBef>
+                <a:spcPct val="0"/>
+              </a:spcBef>
+              <a:spcAft>
+                <a:spcPct val="0"/>
+              </a:spcAft>
+              <a:buClrTx/>
+              <a:buSzTx/>
+              <a:buFontTx/>
+              <a:buNone/>
+              <a:tabLst/>
+            </a:pPr>
+            <a:r>
+              <a:rPr kumimoji="0" lang="de-DE" altLang="de-DE" sz="2000" b="0" i="1" u="none" strike="noStrike" cap="none" normalizeH="0" baseline="0" dirty="0" err="1" smtClean="0">
+                <a:ln>
+                  <a:noFill/>
+                </a:ln>
+                <a:solidFill>
+                  <a:srgbClr val="D55FDE"/>
+                </a:solidFill>
+                <a:effectLst/>
+                <a:latin typeface="JetBrains Mono"/>
+              </a:rPr>
+              <a:t>resource</a:t>
+            </a:r>
+            <a:r>
+              <a:rPr kumimoji="0" lang="de-DE" altLang="de-DE" sz="2000" b="0" i="1" u="none" strike="noStrike" cap="none" normalizeH="0" baseline="0" dirty="0" smtClean="0">
+                <a:ln>
+                  <a:noFill/>
+                </a:ln>
+                <a:solidFill>
+                  <a:srgbClr val="D55FDE"/>
+                </a:solidFill>
+                <a:effectLst/>
+                <a:latin typeface="JetBrains Mono"/>
+              </a:rPr>
+              <a:t> </a:t>
+            </a:r>
+            <a:r>
+              <a:rPr kumimoji="0" lang="de-DE" altLang="de-DE" sz="2000" b="0" i="0" u="none" strike="noStrike" cap="none" normalizeH="0" baseline="0" dirty="0" smtClean="0">
+                <a:ln>
+                  <a:noFill/>
+                </a:ln>
+                <a:solidFill>
+                  <a:srgbClr val="E5C07B"/>
+                </a:solidFill>
+                <a:effectLst/>
+                <a:latin typeface="JetBrains Mono"/>
+              </a:rPr>
+              <a:t>"</a:t>
+            </a:r>
+            <a:r>
+              <a:rPr kumimoji="0" lang="de-DE" altLang="de-DE" sz="2000" b="0" i="0" u="none" strike="noStrike" cap="none" normalizeH="0" baseline="0" dirty="0" err="1" smtClean="0">
+                <a:ln>
+                  <a:noFill/>
+                </a:ln>
+                <a:solidFill>
+                  <a:srgbClr val="E5C07B"/>
+                </a:solidFill>
+                <a:effectLst/>
+                <a:latin typeface="JetBrains Mono"/>
+              </a:rPr>
+              <a:t>aws_instance</a:t>
+            </a:r>
+            <a:r>
+              <a:rPr kumimoji="0" lang="de-DE" altLang="de-DE" sz="2000" b="0" i="0" u="none" strike="noStrike" cap="none" normalizeH="0" baseline="0" dirty="0" smtClean="0">
+                <a:ln>
+                  <a:noFill/>
+                </a:ln>
+                <a:solidFill>
+                  <a:srgbClr val="E5C07B"/>
+                </a:solidFill>
+                <a:effectLst/>
+                <a:latin typeface="JetBrains Mono"/>
+              </a:rPr>
+              <a:t>" "</a:t>
+            </a:r>
+            <a:r>
+              <a:rPr kumimoji="0" lang="de-DE" altLang="de-DE" sz="2000" b="0" i="0" u="none" strike="noStrike" cap="none" normalizeH="0" baseline="0" dirty="0" err="1" smtClean="0">
+                <a:ln>
+                  <a:noFill/>
+                </a:ln>
+                <a:solidFill>
+                  <a:srgbClr val="E5C07B"/>
+                </a:solidFill>
+                <a:effectLst/>
+                <a:latin typeface="JetBrains Mono"/>
+              </a:rPr>
+              <a:t>webserver</a:t>
+            </a:r>
+            <a:r>
+              <a:rPr kumimoji="0" lang="de-DE" altLang="de-DE" sz="2000" b="0" i="0" u="none" strike="noStrike" cap="none" normalizeH="0" baseline="0" dirty="0" smtClean="0">
+                <a:ln>
+                  <a:noFill/>
+                </a:ln>
+                <a:solidFill>
+                  <a:srgbClr val="E5C07B"/>
+                </a:solidFill>
+                <a:effectLst/>
+                <a:latin typeface="JetBrains Mono"/>
+              </a:rPr>
+              <a:t>"</a:t>
+            </a:r>
+            <a:r>
+              <a:rPr kumimoji="0" lang="de-DE" altLang="de-DE" sz="2000" b="0" i="0" u="none" strike="noStrike" cap="none" normalizeH="0" baseline="0" dirty="0" smtClean="0">
+                <a:ln>
+                  <a:noFill/>
+                </a:ln>
+                <a:solidFill>
+                  <a:srgbClr val="BBBBBB"/>
+                </a:solidFill>
+                <a:effectLst/>
+                <a:latin typeface="JetBrains Mono"/>
+              </a:rPr>
+              <a:t>{</a:t>
+            </a:r>
+            <a:br>
+              <a:rPr kumimoji="0" lang="de-DE" altLang="de-DE" sz="2000" b="0" i="0" u="none" strike="noStrike" cap="none" normalizeH="0" baseline="0" dirty="0" smtClean="0">
+                <a:ln>
+                  <a:noFill/>
+                </a:ln>
+                <a:solidFill>
+                  <a:srgbClr val="BBBBBB"/>
+                </a:solidFill>
+                <a:effectLst/>
+                <a:latin typeface="JetBrains Mono"/>
+              </a:rPr>
+            </a:br>
+            <a:r>
+              <a:rPr kumimoji="0" lang="de-DE" altLang="de-DE" sz="2000" b="0" i="0" u="none" strike="noStrike" cap="none" normalizeH="0" baseline="0" dirty="0" smtClean="0">
+                <a:ln>
+                  <a:noFill/>
+                </a:ln>
+                <a:solidFill>
+                  <a:srgbClr val="BBBBBB"/>
+                </a:solidFill>
+                <a:effectLst/>
+                <a:latin typeface="JetBrains Mono"/>
+              </a:rPr>
+              <a:t>  </a:t>
+            </a:r>
+            <a:r>
+              <a:rPr kumimoji="0" lang="de-DE" altLang="de-DE" sz="2000" b="0" i="0" u="none" strike="noStrike" cap="none" normalizeH="0" baseline="0" dirty="0" err="1" smtClean="0">
+                <a:ln>
+                  <a:noFill/>
+                </a:ln>
+                <a:solidFill>
+                  <a:srgbClr val="EF596F"/>
+                </a:solidFill>
+                <a:effectLst/>
+                <a:latin typeface="JetBrains Mono"/>
+              </a:rPr>
+              <a:t>ami</a:t>
+            </a:r>
+            <a:r>
+              <a:rPr kumimoji="0" lang="de-DE" altLang="de-DE" sz="2000" b="0" i="0" u="none" strike="noStrike" cap="none" normalizeH="0" baseline="0" dirty="0" smtClean="0">
+                <a:ln>
+                  <a:noFill/>
+                </a:ln>
+                <a:solidFill>
+                  <a:srgbClr val="EF596F"/>
+                </a:solidFill>
+                <a:effectLst/>
+                <a:latin typeface="JetBrains Mono"/>
+              </a:rPr>
+              <a:t> </a:t>
+            </a:r>
+            <a:r>
+              <a:rPr kumimoji="0" lang="de-DE" altLang="de-DE" sz="2000" b="0" i="0" u="none" strike="noStrike" cap="none" normalizeH="0" baseline="0" dirty="0" smtClean="0">
+                <a:ln>
+                  <a:noFill/>
+                </a:ln>
+                <a:solidFill>
+                  <a:srgbClr val="BBBBBB"/>
+                </a:solidFill>
+                <a:effectLst/>
+                <a:latin typeface="JetBrains Mono"/>
+              </a:rPr>
+              <a:t>= data.</a:t>
+            </a:r>
+            <a:r>
+              <a:rPr kumimoji="0" lang="de-DE" altLang="de-DE" sz="2000" b="0" i="0" u="none" strike="noStrike" cap="none" normalizeH="0" baseline="0" dirty="0" smtClean="0">
+                <a:ln>
+                  <a:noFill/>
+                </a:ln>
+                <a:solidFill>
+                  <a:srgbClr val="EF596F"/>
+                </a:solidFill>
+                <a:effectLst/>
+                <a:latin typeface="JetBrains Mono"/>
+              </a:rPr>
+              <a:t>aws_ami</a:t>
+            </a:r>
+            <a:r>
+              <a:rPr kumimoji="0" lang="de-DE" altLang="de-DE" sz="2000" b="0" i="0" u="none" strike="noStrike" cap="none" normalizeH="0" baseline="0" dirty="0" smtClean="0">
+                <a:ln>
+                  <a:noFill/>
+                </a:ln>
+                <a:solidFill>
+                  <a:srgbClr val="BBBBBB"/>
+                </a:solidFill>
+                <a:effectLst/>
+                <a:latin typeface="JetBrains Mono"/>
+              </a:rPr>
+              <a:t>.</a:t>
+            </a:r>
+            <a:r>
+              <a:rPr kumimoji="0" lang="de-DE" altLang="de-DE" sz="2000" b="0" i="0" u="none" strike="noStrike" cap="none" normalizeH="0" baseline="0" dirty="0" smtClean="0">
+                <a:ln>
+                  <a:noFill/>
+                </a:ln>
+                <a:solidFill>
+                  <a:srgbClr val="EF596F"/>
+                </a:solidFill>
+                <a:effectLst/>
+                <a:latin typeface="JetBrains Mono"/>
+              </a:rPr>
+              <a:t>latest_hvm_ubuntu</a:t>
+            </a:r>
+            <a:r>
+              <a:rPr kumimoji="0" lang="de-DE" altLang="de-DE" sz="2000" b="0" i="0" u="none" strike="noStrike" cap="none" normalizeH="0" baseline="0" dirty="0" smtClean="0">
+                <a:ln>
+                  <a:noFill/>
+                </a:ln>
+                <a:solidFill>
+                  <a:srgbClr val="BBBBBB"/>
+                </a:solidFill>
+                <a:effectLst/>
+                <a:latin typeface="JetBrains Mono"/>
+              </a:rPr>
+              <a:t>.</a:t>
+            </a:r>
+            <a:r>
+              <a:rPr kumimoji="0" lang="de-DE" altLang="de-DE" sz="2000" b="0" i="0" u="none" strike="noStrike" cap="none" normalizeH="0" baseline="0" dirty="0" smtClean="0">
+                <a:ln>
+                  <a:noFill/>
+                </a:ln>
+                <a:solidFill>
+                  <a:srgbClr val="EF596F"/>
+                </a:solidFill>
+                <a:effectLst/>
+                <a:latin typeface="JetBrains Mono"/>
+              </a:rPr>
+              <a:t>id</a:t>
+            </a:r>
+            <a:br>
+              <a:rPr kumimoji="0" lang="de-DE" altLang="de-DE" sz="2000" b="0" i="0" u="none" strike="noStrike" cap="none" normalizeH="0" baseline="0" dirty="0" smtClean="0">
+                <a:ln>
+                  <a:noFill/>
+                </a:ln>
+                <a:solidFill>
+                  <a:srgbClr val="EF596F"/>
+                </a:solidFill>
+                <a:effectLst/>
+                <a:latin typeface="JetBrains Mono"/>
+              </a:rPr>
+            </a:br>
+            <a:r>
+              <a:rPr kumimoji="0" lang="de-DE" altLang="de-DE" sz="2000" b="0" i="0" u="none" strike="noStrike" cap="none" normalizeH="0" baseline="0" dirty="0" smtClean="0">
+                <a:ln>
+                  <a:noFill/>
+                </a:ln>
+                <a:solidFill>
+                  <a:srgbClr val="EF596F"/>
+                </a:solidFill>
+                <a:effectLst/>
+                <a:latin typeface="JetBrains Mono"/>
+              </a:rPr>
+              <a:t>  </a:t>
+            </a:r>
+            <a:r>
+              <a:rPr kumimoji="0" lang="de-DE" altLang="de-DE" sz="2000" b="0" i="0" u="none" strike="noStrike" cap="none" normalizeH="0" baseline="0" dirty="0" err="1" smtClean="0">
+                <a:ln>
+                  <a:noFill/>
+                </a:ln>
+                <a:solidFill>
+                  <a:srgbClr val="EF596F"/>
+                </a:solidFill>
+                <a:effectLst/>
+                <a:latin typeface="JetBrains Mono"/>
+              </a:rPr>
+              <a:t>instance_type</a:t>
+            </a:r>
+            <a:r>
+              <a:rPr kumimoji="0" lang="de-DE" altLang="de-DE" sz="2000" b="0" i="0" u="none" strike="noStrike" cap="none" normalizeH="0" baseline="0" dirty="0" smtClean="0">
+                <a:ln>
+                  <a:noFill/>
+                </a:ln>
+                <a:solidFill>
+                  <a:srgbClr val="EF596F"/>
+                </a:solidFill>
+                <a:effectLst/>
+                <a:latin typeface="JetBrains Mono"/>
+              </a:rPr>
+              <a:t> </a:t>
+            </a:r>
+            <a:r>
+              <a:rPr kumimoji="0" lang="de-DE" altLang="de-DE" sz="2000" b="0" i="0" u="none" strike="noStrike" cap="none" normalizeH="0" baseline="0" dirty="0" smtClean="0">
+                <a:ln>
+                  <a:noFill/>
+                </a:ln>
+                <a:solidFill>
+                  <a:srgbClr val="BBBBBB"/>
+                </a:solidFill>
+                <a:effectLst/>
+                <a:latin typeface="JetBrains Mono"/>
+              </a:rPr>
+              <a:t>= </a:t>
+            </a:r>
+            <a:r>
+              <a:rPr kumimoji="0" lang="de-DE" altLang="de-DE" sz="2000" b="0" i="0" u="none" strike="noStrike" cap="none" normalizeH="0" baseline="0" dirty="0" err="1" smtClean="0">
+                <a:ln>
+                  <a:noFill/>
+                </a:ln>
+                <a:solidFill>
+                  <a:srgbClr val="BBBBBB"/>
+                </a:solidFill>
+                <a:effectLst/>
+                <a:latin typeface="JetBrains Mono"/>
+              </a:rPr>
+              <a:t>var.</a:t>
+            </a:r>
+            <a:r>
+              <a:rPr kumimoji="0" lang="de-DE" altLang="de-DE" sz="2000" b="0" i="0" u="none" strike="noStrike" cap="none" normalizeH="0" baseline="0" dirty="0" err="1" smtClean="0">
+                <a:ln>
+                  <a:noFill/>
+                </a:ln>
+                <a:solidFill>
+                  <a:srgbClr val="EF596F"/>
+                </a:solidFill>
+                <a:effectLst/>
+                <a:latin typeface="JetBrains Mono"/>
+              </a:rPr>
+              <a:t>instance_type</a:t>
+            </a:r>
+            <a:r>
+              <a:rPr kumimoji="0" lang="de-DE" altLang="de-DE" sz="2000" b="0" i="0" u="none" strike="noStrike" cap="none" normalizeH="0" baseline="0" dirty="0" smtClean="0">
+                <a:ln>
+                  <a:noFill/>
+                </a:ln>
+                <a:solidFill>
+                  <a:srgbClr val="EF596F"/>
+                </a:solidFill>
+                <a:effectLst/>
+                <a:latin typeface="JetBrains Mono"/>
+              </a:rPr>
+              <a:t/>
+            </a:r>
+            <a:br>
+              <a:rPr kumimoji="0" lang="de-DE" altLang="de-DE" sz="2000" b="0" i="0" u="none" strike="noStrike" cap="none" normalizeH="0" baseline="0" dirty="0" smtClean="0">
+                <a:ln>
+                  <a:noFill/>
+                </a:ln>
+                <a:solidFill>
+                  <a:srgbClr val="EF596F"/>
+                </a:solidFill>
+                <a:effectLst/>
+                <a:latin typeface="JetBrains Mono"/>
+              </a:rPr>
+            </a:br>
+            <a:r>
+              <a:rPr kumimoji="0" lang="de-DE" altLang="de-DE" sz="2000" b="0" i="0" u="none" strike="noStrike" cap="none" normalizeH="0" baseline="0" dirty="0" smtClean="0">
+                <a:ln>
+                  <a:noFill/>
+                </a:ln>
+                <a:solidFill>
+                  <a:srgbClr val="EF596F"/>
+                </a:solidFill>
+                <a:effectLst/>
+                <a:latin typeface="JetBrains Mono"/>
+              </a:rPr>
+              <a:t>  </a:t>
+            </a:r>
+            <a:r>
+              <a:rPr kumimoji="0" lang="de-DE" altLang="de-DE" sz="2000" b="0" i="0" u="none" strike="noStrike" cap="none" normalizeH="0" baseline="0" dirty="0" err="1" smtClean="0">
+                <a:ln>
+                  <a:noFill/>
+                </a:ln>
+                <a:solidFill>
+                  <a:srgbClr val="EF596F"/>
+                </a:solidFill>
+                <a:effectLst/>
+                <a:latin typeface="JetBrains Mono"/>
+              </a:rPr>
+              <a:t>security_groups</a:t>
+            </a:r>
+            <a:r>
+              <a:rPr kumimoji="0" lang="de-DE" altLang="de-DE" sz="2000" b="0" i="0" u="none" strike="noStrike" cap="none" normalizeH="0" baseline="0" dirty="0" smtClean="0">
+                <a:ln>
+                  <a:noFill/>
+                </a:ln>
+                <a:solidFill>
+                  <a:srgbClr val="EF596F"/>
+                </a:solidFill>
+                <a:effectLst/>
+                <a:latin typeface="JetBrains Mono"/>
+              </a:rPr>
+              <a:t> </a:t>
+            </a:r>
+            <a:r>
+              <a:rPr kumimoji="0" lang="de-DE" altLang="de-DE" sz="2000" b="0" i="0" u="none" strike="noStrike" cap="none" normalizeH="0" baseline="0" dirty="0" smtClean="0">
+                <a:ln>
+                  <a:noFill/>
+                </a:ln>
+                <a:solidFill>
+                  <a:srgbClr val="BBBBBB"/>
+                </a:solidFill>
+                <a:effectLst/>
+                <a:latin typeface="JetBrains Mono"/>
+              </a:rPr>
+              <a:t>= [</a:t>
+            </a:r>
+            <a:r>
+              <a:rPr kumimoji="0" lang="de-DE" altLang="de-DE" sz="2000" b="0" i="0" u="none" strike="noStrike" cap="none" normalizeH="0" baseline="0" dirty="0" smtClean="0">
+                <a:ln>
+                  <a:noFill/>
+                </a:ln>
+                <a:solidFill>
+                  <a:srgbClr val="E5C07B"/>
+                </a:solidFill>
+                <a:effectLst/>
+                <a:latin typeface="JetBrains Mono"/>
+              </a:rPr>
+              <a:t>aws_security_group</a:t>
+            </a:r>
+            <a:r>
+              <a:rPr kumimoji="0" lang="de-DE" altLang="de-DE" sz="2000" b="0" i="0" u="none" strike="noStrike" cap="none" normalizeH="0" baseline="0" dirty="0" smtClean="0">
+                <a:ln>
+                  <a:noFill/>
+                </a:ln>
+                <a:solidFill>
+                  <a:srgbClr val="BBBBBB"/>
+                </a:solidFill>
+                <a:effectLst/>
+                <a:latin typeface="JetBrains Mono"/>
+              </a:rPr>
+              <a:t>.</a:t>
+            </a:r>
+            <a:r>
+              <a:rPr kumimoji="0" lang="de-DE" altLang="de-DE" sz="2000" b="0" i="0" u="none" strike="noStrike" cap="none" normalizeH="0" baseline="0" dirty="0" smtClean="0">
+                <a:ln>
+                  <a:noFill/>
+                </a:ln>
+                <a:solidFill>
+                  <a:srgbClr val="E5C07B"/>
+                </a:solidFill>
+                <a:effectLst/>
+                <a:latin typeface="JetBrains Mono"/>
+              </a:rPr>
+              <a:t>webserver</a:t>
+            </a:r>
+            <a:r>
+              <a:rPr kumimoji="0" lang="de-DE" altLang="de-DE" sz="2000" b="0" i="0" u="none" strike="noStrike" cap="none" normalizeH="0" baseline="0" dirty="0" smtClean="0">
+                <a:ln>
+                  <a:noFill/>
+                </a:ln>
+                <a:solidFill>
+                  <a:srgbClr val="BBBBBB"/>
+                </a:solidFill>
+                <a:effectLst/>
+                <a:latin typeface="JetBrains Mono"/>
+              </a:rPr>
+              <a:t>.</a:t>
+            </a:r>
+            <a:r>
+              <a:rPr kumimoji="0" lang="de-DE" altLang="de-DE" sz="2000" b="0" i="0" u="none" strike="noStrike" cap="none" normalizeH="0" baseline="0" dirty="0" smtClean="0">
+                <a:ln>
+                  <a:noFill/>
+                </a:ln>
+                <a:solidFill>
+                  <a:srgbClr val="EF596F"/>
+                </a:solidFill>
+                <a:effectLst/>
+                <a:latin typeface="JetBrains Mono"/>
+              </a:rPr>
+              <a:t>name</a:t>
+            </a:r>
+            <a:r>
+              <a:rPr kumimoji="0" lang="de-DE" altLang="de-DE" sz="2000" b="0" i="0" u="none" strike="noStrike" cap="none" normalizeH="0" baseline="0" dirty="0" smtClean="0">
+                <a:ln>
+                  <a:noFill/>
+                </a:ln>
+                <a:solidFill>
+                  <a:srgbClr val="BBBBBB"/>
+                </a:solidFill>
+                <a:effectLst/>
+                <a:latin typeface="JetBrains Mono"/>
+              </a:rPr>
+              <a:t>]</a:t>
+            </a:r>
+            <a:br>
+              <a:rPr kumimoji="0" lang="de-DE" altLang="de-DE" sz="2000" b="0" i="0" u="none" strike="noStrike" cap="none" normalizeH="0" baseline="0" dirty="0" smtClean="0">
+                <a:ln>
+                  <a:noFill/>
+                </a:ln>
+                <a:solidFill>
+                  <a:srgbClr val="BBBBBB"/>
+                </a:solidFill>
+                <a:effectLst/>
+                <a:latin typeface="JetBrains Mono"/>
+              </a:rPr>
+            </a:br>
+            <a:r>
+              <a:rPr kumimoji="0" lang="de-DE" altLang="de-DE" sz="2000" b="0" i="0" u="none" strike="noStrike" cap="none" normalizeH="0" baseline="0" dirty="0" smtClean="0">
+                <a:ln>
+                  <a:noFill/>
+                </a:ln>
+                <a:solidFill>
+                  <a:srgbClr val="BBBBBB"/>
+                </a:solidFill>
+                <a:effectLst/>
+                <a:latin typeface="JetBrains Mono"/>
+              </a:rPr>
+              <a:t>  </a:t>
+            </a:r>
+            <a:r>
+              <a:rPr kumimoji="0" lang="de-DE" altLang="de-DE" sz="2000" b="0" i="0" u="none" strike="noStrike" cap="none" normalizeH="0" baseline="0" dirty="0" smtClean="0">
+                <a:ln>
+                  <a:noFill/>
+                </a:ln>
+                <a:solidFill>
+                  <a:srgbClr val="EF596F"/>
+                </a:solidFill>
+                <a:effectLst/>
+                <a:latin typeface="JetBrains Mono"/>
+              </a:rPr>
+              <a:t>tags </a:t>
+            </a:r>
+            <a:r>
+              <a:rPr kumimoji="0" lang="de-DE" altLang="de-DE" sz="2000" b="0" i="0" u="none" strike="noStrike" cap="none" normalizeH="0" baseline="0" dirty="0" smtClean="0">
+                <a:ln>
+                  <a:noFill/>
+                </a:ln>
+                <a:solidFill>
+                  <a:srgbClr val="BBBBBB"/>
+                </a:solidFill>
+                <a:effectLst/>
+                <a:latin typeface="JetBrains Mono"/>
+              </a:rPr>
+              <a:t>= {</a:t>
+            </a:r>
+            <a:br>
+              <a:rPr kumimoji="0" lang="de-DE" altLang="de-DE" sz="2000" b="0" i="0" u="none" strike="noStrike" cap="none" normalizeH="0" baseline="0" dirty="0" smtClean="0">
+                <a:ln>
+                  <a:noFill/>
+                </a:ln>
+                <a:solidFill>
+                  <a:srgbClr val="BBBBBB"/>
+                </a:solidFill>
+                <a:effectLst/>
+                <a:latin typeface="JetBrains Mono"/>
+              </a:rPr>
+            </a:br>
+            <a:r>
+              <a:rPr kumimoji="0" lang="de-DE" altLang="de-DE" sz="2000" b="0" i="0" u="none" strike="noStrike" cap="none" normalizeH="0" baseline="0" dirty="0" smtClean="0">
+                <a:ln>
+                  <a:noFill/>
+                </a:ln>
+                <a:solidFill>
+                  <a:srgbClr val="BBBBBB"/>
+                </a:solidFill>
+                <a:effectLst/>
+                <a:latin typeface="JetBrains Mono"/>
+              </a:rPr>
+              <a:t>    </a:t>
+            </a:r>
+            <a:r>
+              <a:rPr kumimoji="0" lang="de-DE" altLang="de-DE" sz="2000" b="0" i="0" u="none" strike="noStrike" cap="none" normalizeH="0" baseline="0" dirty="0" smtClean="0">
+                <a:ln>
+                  <a:noFill/>
+                </a:ln>
+                <a:solidFill>
+                  <a:srgbClr val="EF596F"/>
+                </a:solidFill>
+                <a:effectLst/>
+                <a:latin typeface="JetBrains Mono"/>
+              </a:rPr>
+              <a:t>Name </a:t>
+            </a:r>
+            <a:r>
+              <a:rPr kumimoji="0" lang="de-DE" altLang="de-DE" sz="2000" b="0" i="0" u="none" strike="noStrike" cap="none" normalizeH="0" baseline="0" dirty="0" smtClean="0">
+                <a:ln>
+                  <a:noFill/>
+                </a:ln>
+                <a:solidFill>
+                  <a:srgbClr val="BBBBBB"/>
+                </a:solidFill>
+                <a:effectLst/>
+                <a:latin typeface="JetBrains Mono"/>
+              </a:rPr>
+              <a:t>= </a:t>
+            </a:r>
+            <a:r>
+              <a:rPr kumimoji="0" lang="de-DE" altLang="de-DE" sz="2000" b="0" i="0" u="none" strike="noStrike" cap="none" normalizeH="0" baseline="0" dirty="0" smtClean="0">
+                <a:ln>
+                  <a:noFill/>
+                </a:ln>
+                <a:solidFill>
+                  <a:srgbClr val="89CA78"/>
+                </a:solidFill>
+                <a:effectLst/>
+                <a:latin typeface="JetBrains Mono"/>
+              </a:rPr>
+              <a:t>"</a:t>
+            </a:r>
+            <a:r>
+              <a:rPr kumimoji="0" lang="de-DE" altLang="de-DE" sz="2000" b="0" i="0" u="none" strike="noStrike" cap="none" normalizeH="0" baseline="0" dirty="0" err="1" smtClean="0">
+                <a:ln>
+                  <a:noFill/>
+                </a:ln>
+                <a:solidFill>
+                  <a:srgbClr val="89CA78"/>
+                </a:solidFill>
+                <a:effectLst/>
+                <a:latin typeface="JetBrains Mono"/>
+              </a:rPr>
+              <a:t>webserver</a:t>
+            </a:r>
+            <a:r>
+              <a:rPr kumimoji="0" lang="de-DE" altLang="de-DE" sz="2000" b="0" i="0" u="none" strike="noStrike" cap="none" normalizeH="0" baseline="0" dirty="0" smtClean="0">
+                <a:ln>
+                  <a:noFill/>
+                </a:ln>
+                <a:solidFill>
+                  <a:srgbClr val="89CA78"/>
+                </a:solidFill>
+                <a:effectLst/>
+                <a:latin typeface="JetBrains Mono"/>
+              </a:rPr>
+              <a:t> - ${</a:t>
+            </a:r>
+            <a:r>
+              <a:rPr kumimoji="0" lang="de-DE" altLang="de-DE" sz="2000" b="0" i="0" u="none" strike="noStrike" cap="none" normalizeH="0" baseline="0" dirty="0" err="1" smtClean="0">
+                <a:ln>
+                  <a:noFill/>
+                </a:ln>
+                <a:solidFill>
+                  <a:srgbClr val="89CA78"/>
+                </a:solidFill>
+                <a:effectLst/>
+                <a:latin typeface="JetBrains Mono"/>
+              </a:rPr>
+              <a:t>terraform.</a:t>
+            </a:r>
+            <a:r>
+              <a:rPr kumimoji="0" lang="de-DE" altLang="de-DE" sz="2000" b="0" i="0" u="none" strike="noStrike" cap="none" normalizeH="0" baseline="0" dirty="0" err="1" smtClean="0">
+                <a:ln>
+                  <a:noFill/>
+                </a:ln>
+                <a:solidFill>
+                  <a:srgbClr val="EF596F"/>
+                </a:solidFill>
+                <a:effectLst/>
+                <a:latin typeface="JetBrains Mono"/>
+              </a:rPr>
+              <a:t>workspace</a:t>
+            </a:r>
+            <a:r>
+              <a:rPr kumimoji="0" lang="de-DE" altLang="de-DE" sz="2000" b="0" i="0" u="none" strike="noStrike" cap="none" normalizeH="0" baseline="0" dirty="0" smtClean="0">
+                <a:ln>
+                  <a:noFill/>
+                </a:ln>
+                <a:solidFill>
+                  <a:srgbClr val="89CA78"/>
+                </a:solidFill>
+                <a:effectLst/>
+                <a:latin typeface="JetBrains Mono"/>
+              </a:rPr>
+              <a:t>}"</a:t>
+            </a:r>
+            <a:br>
+              <a:rPr kumimoji="0" lang="de-DE" altLang="de-DE" sz="2000" b="0" i="0" u="none" strike="noStrike" cap="none" normalizeH="0" baseline="0" dirty="0" smtClean="0">
+                <a:ln>
+                  <a:noFill/>
+                </a:ln>
+                <a:solidFill>
+                  <a:srgbClr val="89CA78"/>
+                </a:solidFill>
+                <a:effectLst/>
+                <a:latin typeface="JetBrains Mono"/>
+              </a:rPr>
+            </a:br>
+            <a:r>
+              <a:rPr kumimoji="0" lang="de-DE" altLang="de-DE" sz="2000" b="0" i="0" u="none" strike="noStrike" cap="none" normalizeH="0" baseline="0" dirty="0" smtClean="0">
+                <a:ln>
+                  <a:noFill/>
+                </a:ln>
+                <a:solidFill>
+                  <a:srgbClr val="89CA78"/>
+                </a:solidFill>
+                <a:effectLst/>
+                <a:latin typeface="JetBrains Mono"/>
+              </a:rPr>
+              <a:t>  </a:t>
+            </a:r>
+            <a:r>
+              <a:rPr kumimoji="0" lang="de-DE" altLang="de-DE" sz="2000" b="0" i="0" u="none" strike="noStrike" cap="none" normalizeH="0" baseline="0" dirty="0" smtClean="0">
+                <a:ln>
+                  <a:noFill/>
+                </a:ln>
+                <a:solidFill>
+                  <a:srgbClr val="BBBBBB"/>
+                </a:solidFill>
+                <a:effectLst/>
+                <a:latin typeface="JetBrains Mono"/>
+              </a:rPr>
+              <a:t>}</a:t>
+            </a:r>
+            <a:br>
+              <a:rPr kumimoji="0" lang="de-DE" altLang="de-DE" sz="2000" b="0" i="0" u="none" strike="noStrike" cap="none" normalizeH="0" baseline="0" dirty="0" smtClean="0">
+                <a:ln>
+                  <a:noFill/>
+                </a:ln>
+                <a:solidFill>
+                  <a:srgbClr val="BBBBBB"/>
+                </a:solidFill>
+                <a:effectLst/>
+                <a:latin typeface="JetBrains Mono"/>
+              </a:rPr>
+            </a:br>
+            <a:r>
+              <a:rPr kumimoji="0" lang="de-DE" altLang="de-DE" sz="2000" b="0" i="0" u="none" strike="noStrike" cap="none" normalizeH="0" baseline="0" dirty="0" smtClean="0">
+                <a:ln>
+                  <a:noFill/>
+                </a:ln>
+                <a:solidFill>
+                  <a:srgbClr val="BBBBBB"/>
+                </a:solidFill>
+                <a:effectLst/>
+                <a:latin typeface="JetBrains Mono"/>
+              </a:rPr>
+              <a:t>}</a:t>
+            </a:r>
+            <a:endParaRPr kumimoji="0" lang="de-DE" altLang="de-DE" sz="2000" b="0" i="0" u="none" strike="noStrike" cap="none" normalizeH="0" baseline="0" dirty="0" smtClean="0">
+              <a:ln>
+                <a:noFill/>
+              </a:ln>
+              <a:solidFill>
+                <a:schemeClr val="tx1"/>
+              </a:solidFill>
+              <a:effectLst/>
+              <a:latin typeface="Arial" panose="020B0604020202020204" pitchFamily="34" charset="0"/>
+            </a:endParaRPr>
+          </a:p>
+        </p:txBody>
+      </p:sp>
+    </p:spTree>
+    <p:extLst>
+      <p:ext uri="{BB962C8B-B14F-4D97-AF65-F5344CB8AC3E}">
+        <p14:creationId xmlns:p14="http://schemas.microsoft.com/office/powerpoint/2010/main" val="331539402"/>
+      </p:ext>
+    </p:extLst>
+  </p:cSld>
+  <p:clrMapOvr>
+    <a:masterClrMapping/>
+  </p:clrMapOvr>
+</p:sld>
+</file>
+
+<file path=ppt/slides/slide6.xml><?xml version="1.0" encoding="utf-8"?>
+<p:sld xmlns:a="http://schemas.openxmlformats.org/drawingml/2006/main" xmlns:r="http://schemas.openxmlformats.org/officeDocument/2006/relationships" xmlns:p="http://schemas.openxmlformats.org/presentationml/2006/main">
+  <p:cSld>
+    <p:spTree>
+      <p:nvGrpSpPr>
+        <p:cNvPr id="1" name=""/>
+        <p:cNvGrpSpPr/>
+        <p:nvPr/>
+      </p:nvGrpSpPr>
+      <p:grpSpPr>
+        <a:xfrm>
+          <a:off x="0" y="0"/>
+          <a:ext cx="0" cy="0"/>
+          <a:chOff x="0" y="0"/>
+          <a:chExt cx="0" cy="0"/>
+        </a:xfrm>
+      </p:grpSpPr>
+      <p:sp>
+        <p:nvSpPr>
+          <p:cNvPr id="2" name="Titel 1"/>
+          <p:cNvSpPr>
+            <a:spLocks noGrp="1"/>
+          </p:cNvSpPr>
+          <p:nvPr>
+            <p:ph type="title"/>
+          </p:nvPr>
+        </p:nvSpPr>
+        <p:spPr>
+          <a:xfrm>
+            <a:off x="838200" y="390525"/>
+            <a:ext cx="10515600" cy="1325563"/>
+          </a:xfrm>
+        </p:spPr>
+        <p:txBody>
+          <a:bodyPr/>
+          <a:lstStyle/>
+          <a:p>
+            <a:r>
+              <a:rPr lang="de-DE" dirty="0" smtClean="0"/>
+              <a:t>Fallstricke</a:t>
+            </a:r>
+            <a:endParaRPr lang="de-DE" dirty="0"/>
+          </a:p>
+        </p:txBody>
+      </p:sp>
+      <p:sp>
+        <p:nvSpPr>
+          <p:cNvPr id="14" name="Inhaltsplatzhalter 2"/>
+          <p:cNvSpPr>
+            <a:spLocks noGrp="1"/>
+          </p:cNvSpPr>
+          <p:nvPr>
+            <p:ph idx="1"/>
+          </p:nvPr>
+        </p:nvSpPr>
+        <p:spPr>
+          <a:xfrm>
+            <a:off x="838200" y="1825625"/>
+            <a:ext cx="10515600" cy="4351338"/>
+          </a:xfrm>
+        </p:spPr>
+        <p:txBody>
+          <a:bodyPr>
+            <a:normAutofit/>
+          </a:bodyPr>
+          <a:lstStyle/>
+          <a:p>
+            <a:r>
+              <a:rPr lang="de-DE" dirty="0" smtClean="0"/>
+              <a:t>Die Konfiguration muss entsprechenden Regeln entsprechen, damit ein </a:t>
+            </a:r>
+            <a:r>
+              <a:rPr lang="de-DE" dirty="0" err="1" smtClean="0"/>
+              <a:t>apply</a:t>
+            </a:r>
+            <a:r>
+              <a:rPr lang="de-DE" dirty="0" smtClean="0"/>
+              <a:t> in unterschiedlichen </a:t>
+            </a:r>
+            <a:r>
+              <a:rPr lang="de-DE" dirty="0" err="1" smtClean="0"/>
+              <a:t>Workspaces</a:t>
+            </a:r>
+            <a:r>
+              <a:rPr lang="de-DE" dirty="0" smtClean="0"/>
+              <a:t> erfolgreich ist</a:t>
+            </a:r>
+          </a:p>
+          <a:p>
+            <a:pPr lvl="1"/>
+            <a:r>
+              <a:rPr lang="de-DE" dirty="0" smtClean="0"/>
+              <a:t>Einige Ressourcen erfordern beispielsweise eindeutige Namen</a:t>
+            </a:r>
+          </a:p>
+          <a:p>
+            <a:r>
+              <a:rPr lang="de-DE" dirty="0" smtClean="0"/>
+              <a:t>Erfordert Achtsamkeit des Entwicklers</a:t>
+            </a:r>
+          </a:p>
+          <a:p>
+            <a:pPr lvl="1"/>
+            <a:r>
+              <a:rPr lang="de-DE" dirty="0" smtClean="0"/>
+              <a:t>Es kann leicht das </a:t>
+            </a:r>
+            <a:r>
+              <a:rPr lang="de-DE" i="1" dirty="0" err="1" smtClean="0"/>
+              <a:t>terraform</a:t>
+            </a:r>
+            <a:r>
+              <a:rPr lang="de-DE" i="1" dirty="0" smtClean="0"/>
+              <a:t> </a:t>
+            </a:r>
+            <a:r>
+              <a:rPr lang="de-DE" i="1" dirty="0" err="1" smtClean="0"/>
+              <a:t>apply</a:t>
+            </a:r>
+            <a:r>
+              <a:rPr lang="de-DE" i="1" dirty="0" smtClean="0"/>
+              <a:t> </a:t>
+            </a:r>
+            <a:r>
+              <a:rPr lang="de-DE" dirty="0" smtClean="0"/>
+              <a:t>des falschen Workspace ausgeführt werden</a:t>
+            </a:r>
+          </a:p>
+          <a:p>
+            <a:pPr marL="0" indent="0">
+              <a:buNone/>
+            </a:pPr>
+            <a:endParaRPr lang="de-DE" dirty="0" smtClean="0"/>
+          </a:p>
+          <a:p>
+            <a:endParaRPr lang="de-DE" dirty="0" smtClean="0"/>
+          </a:p>
+          <a:p>
+            <a:endParaRPr lang="de-DE" dirty="0" smtClean="0"/>
+          </a:p>
+        </p:txBody>
+      </p:sp>
+    </p:spTree>
+    <p:extLst>
+      <p:ext uri="{BB962C8B-B14F-4D97-AF65-F5344CB8AC3E}">
+        <p14:creationId xmlns:p14="http://schemas.microsoft.com/office/powerpoint/2010/main" val="4208235986"/>
+      </p:ext>
+    </p:extLst>
+  </p:cSld>
+  <p:clrMapOvr>
+    <a:masterClrMapping/>
+  </p:clrMapOvr>
 </p:sld>
 </file>
 

</xml_diff>